<commit_message>
disabled implementation of roundabout slide
</commit_message>
<xml_diff>
--- a/presentation/Presentation - Intersection Problem.pptx
+++ b/presentation/Presentation - Intersection Problem.pptx
@@ -199,7 +199,7 @@
           <a:bodyPr anchor="b" bIns="0" lIns="0" rIns="0" tIns="0" wrap="none"/>
           <a:p>
             <a:pPr algn="r"/>
-            <a:fld id="{FCFB0324-0471-429E-B31F-ACC067C23E4F}" type="slidenum">
+            <a:fld id="{3C5AC387-6B82-44D0-845E-C9C45F99E872}" type="slidenum">
               <a:rPr lang="de-DE"/>
               <a:t>&lt;Nummer&gt;</a:t>
             </a:fld>
@@ -290,7 +290,7 @@
                 <a:spcPct val="100000"/>
               </a:lnSpc>
             </a:pPr>
-            <a:fld id="{611DFDE7-902B-4086-A60A-970971523A2E}" type="slidenum">
+            <a:fld id="{7E3D0FE7-DF39-4762-BF91-C7B2C97282C6}" type="slidenum">
               <a:rPr lang="de-DE" sz="1200">
                 <a:solidFill>
                   <a:srgbClr val="000000"/>
@@ -364,7 +364,7 @@
                 <a:spcPct val="100000"/>
               </a:lnSpc>
             </a:pPr>
-            <a:fld id="{2AD5C4D4-98F3-4826-97D6-EFCC6EED20C9}" type="slidenum">
+            <a:fld id="{9F266838-5AAE-4D0D-B68D-6169F908616B}" type="slidenum">
               <a:rPr lang="de-DE" sz="1200">
                 <a:solidFill>
                   <a:srgbClr val="000000"/>
@@ -486,7 +486,7 @@
                 <a:spcPct val="100000"/>
               </a:lnSpc>
             </a:pPr>
-            <a:fld id="{9EF920F9-F592-4B59-9E55-8D9325750E27}" type="slidenum">
+            <a:fld id="{EAD46157-4C0F-4674-966C-D977BF143E96}" type="slidenum">
               <a:rPr lang="de-DE" sz="1200">
                 <a:solidFill>
                   <a:srgbClr val="000000"/>
@@ -608,7 +608,7 @@
                 <a:spcPct val="100000"/>
               </a:lnSpc>
             </a:pPr>
-            <a:fld id="{7B9B7E9A-0CD5-4960-B0D4-D58798673E4F}" type="slidenum">
+            <a:fld id="{134AF71D-D176-48E2-9CC6-671D4E76D43B}" type="slidenum">
               <a:rPr lang="de-DE" sz="1200">
                 <a:solidFill>
                   <a:srgbClr val="000000"/>
@@ -730,7 +730,7 @@
                 <a:spcPct val="100000"/>
               </a:lnSpc>
             </a:pPr>
-            <a:fld id="{43DA2E1F-9451-442C-98E2-4E285F6C67AB}" type="slidenum">
+            <a:fld id="{0BF13047-D6AB-43FE-8D70-3553C76E1EFE}" type="slidenum">
               <a:rPr lang="de-DE" sz="1200">
                 <a:solidFill>
                   <a:srgbClr val="000000"/>
@@ -852,7 +852,7 @@
                 <a:spcPct val="100000"/>
               </a:lnSpc>
             </a:pPr>
-            <a:fld id="{AEAEDC7F-23C9-4D1E-B353-77CCDEB5F769}" type="slidenum">
+            <a:fld id="{3435C9C9-CAE1-45D8-8EFE-483A6EF4CB4C}" type="slidenum">
               <a:rPr lang="de-DE" sz="1200">
                 <a:solidFill>
                   <a:srgbClr val="000000"/>
@@ -974,7 +974,7 @@
                 <a:spcPct val="100000"/>
               </a:lnSpc>
             </a:pPr>
-            <a:fld id="{D58D92F9-391B-4AE7-8365-72FFA555DD89}" type="slidenum">
+            <a:fld id="{F7F70E9B-91D5-4DA8-9E8F-4F602BC834AA}" type="slidenum">
               <a:rPr lang="de-DE" sz="1200">
                 <a:solidFill>
                   <a:srgbClr val="000000"/>
@@ -1096,7 +1096,7 @@
                 <a:spcPct val="100000"/>
               </a:lnSpc>
             </a:pPr>
-            <a:fld id="{F5AE460F-0482-4159-8980-1AC532CF396E}" type="slidenum">
+            <a:fld id="{B8EEE907-BB50-43F7-8E32-411F59BB08E0}" type="slidenum">
               <a:rPr lang="de-DE" sz="1200">
                 <a:solidFill>
                   <a:srgbClr val="000000"/>
@@ -1218,7 +1218,7 @@
                 <a:spcPct val="100000"/>
               </a:lnSpc>
             </a:pPr>
-            <a:fld id="{451F1AAA-B0D2-4CB5-9628-BD358D6A2C9A}" type="slidenum">
+            <a:fld id="{B350B39E-34CF-4712-AA1E-4480E74084FB}" type="slidenum">
               <a:rPr lang="de-DE" sz="1200">
                 <a:solidFill>
                   <a:srgbClr val="000000"/>
@@ -1340,7 +1340,7 @@
                 <a:spcPct val="100000"/>
               </a:lnSpc>
             </a:pPr>
-            <a:fld id="{F6A2FB01-D4A7-4FA7-BDB8-15E5A8A25E19}" type="slidenum">
+            <a:fld id="{A59CA5B7-024E-4D1B-9F41-A02E4CFCD958}" type="slidenum">
               <a:rPr lang="de-DE" sz="1200">
                 <a:solidFill>
                   <a:srgbClr val="000000"/>
@@ -1462,7 +1462,7 @@
                 <a:spcPct val="100000"/>
               </a:lnSpc>
             </a:pPr>
-            <a:fld id="{9485468A-0C64-4B6B-90DD-9DA2D9B2A072}" type="slidenum">
+            <a:fld id="{AE7B1B4F-7D65-4EB3-91F0-FA2A7FB570D5}" type="slidenum">
               <a:rPr lang="de-DE" sz="1200">
                 <a:solidFill>
                   <a:srgbClr val="000000"/>
@@ -1584,7 +1584,7 @@
                 <a:spcPct val="100000"/>
               </a:lnSpc>
             </a:pPr>
-            <a:fld id="{320349C1-1A2E-44F4-8566-05B30F4FAB52}" type="slidenum">
+            <a:fld id="{18B410C9-E7F1-4C19-A9D0-CEF035A44792}" type="slidenum">
               <a:rPr lang="de-DE" sz="1200">
                 <a:solidFill>
                   <a:srgbClr val="000000"/>
@@ -1706,7 +1706,7 @@
                 <a:spcPct val="100000"/>
               </a:lnSpc>
             </a:pPr>
-            <a:fld id="{DD3C9293-1E41-411A-96D9-62A262A2812E}" type="slidenum">
+            <a:fld id="{9CA8A326-F67C-47C4-A93A-1BC12633C39E}" type="slidenum">
               <a:rPr lang="de-DE" sz="1200">
                 <a:solidFill>
                   <a:srgbClr val="000000"/>
@@ -1780,7 +1780,7 @@
                 <a:spcPct val="100000"/>
               </a:lnSpc>
             </a:pPr>
-            <a:fld id="{314571C2-6142-470C-B361-FD5D5F1D58C5}" type="slidenum">
+            <a:fld id="{0C388361-0AF6-4FD5-BE31-6CF452AA9F90}" type="slidenum">
               <a:rPr lang="de-DE" sz="1200">
                 <a:solidFill>
                   <a:srgbClr val="000000"/>
@@ -1902,7 +1902,7 @@
                 <a:spcPct val="100000"/>
               </a:lnSpc>
             </a:pPr>
-            <a:fld id="{EFF4B0AA-0AEE-45E3-853E-FF7E6AB68F0E}" type="slidenum">
+            <a:fld id="{E55F3D30-C5E8-439E-850C-8618269E71FC}" type="slidenum">
               <a:rPr lang="de-DE" sz="2400">
                 <a:solidFill>
                   <a:srgbClr val="ffffff"/>
@@ -1976,7 +1976,7 @@
                 <a:spcPct val="100000"/>
               </a:lnSpc>
             </a:pPr>
-            <a:fld id="{8F2DFA10-A76E-454A-8FDA-B2504CDB73B4}" type="slidenum">
+            <a:fld id="{2589FFBA-E558-4BEB-AE40-BC17A8CE4BC7}" type="slidenum">
               <a:rPr lang="de-DE" sz="1200">
                 <a:solidFill>
                   <a:srgbClr val="000000"/>
@@ -2098,7 +2098,7 @@
                 <a:spcPct val="100000"/>
               </a:lnSpc>
             </a:pPr>
-            <a:fld id="{46C5EE03-D22A-4656-AE81-FF9E35AFACD8}" type="slidenum">
+            <a:fld id="{974F6E7B-01B8-45DE-AB27-31F58FE60B26}" type="slidenum">
               <a:rPr lang="de-DE" sz="2400">
                 <a:solidFill>
                   <a:srgbClr val="ffffff"/>
@@ -2172,7 +2172,7 @@
                 <a:spcPct val="100000"/>
               </a:lnSpc>
             </a:pPr>
-            <a:fld id="{983B2FBC-4394-4F27-B840-E64ABB92F942}" type="slidenum">
+            <a:fld id="{A2A89530-012C-440A-B321-5EC818C96779}" type="slidenum">
               <a:rPr lang="de-DE" sz="1200">
                 <a:solidFill>
                   <a:srgbClr val="000000"/>
@@ -2294,7 +2294,7 @@
                 <a:spcPct val="100000"/>
               </a:lnSpc>
             </a:pPr>
-            <a:fld id="{A62CB1A8-A3C1-4180-9267-43B8EC44AA36}" type="slidenum">
+            <a:fld id="{DB74EFA2-6DF5-404E-92C5-6F2952B070E6}" type="slidenum">
               <a:rPr lang="de-DE" sz="2400">
                 <a:solidFill>
                   <a:srgbClr val="ffffff"/>
@@ -2368,7 +2368,7 @@
                 <a:spcPct val="100000"/>
               </a:lnSpc>
             </a:pPr>
-            <a:fld id="{A15C1657-A197-448B-BC2D-FE3599B3B24A}" type="slidenum">
+            <a:fld id="{CCD02C04-98A4-452F-859F-97994CB7147A}" type="slidenum">
               <a:rPr lang="de-DE" sz="1200">
                 <a:solidFill>
                   <a:srgbClr val="000000"/>
@@ -2490,7 +2490,7 @@
                 <a:spcPct val="100000"/>
               </a:lnSpc>
             </a:pPr>
-            <a:fld id="{A046E158-8DED-4B92-97AA-F51F06850342}" type="slidenum">
+            <a:fld id="{9AF49A43-589C-490A-85EA-F8E11E2971D9}" type="slidenum">
               <a:rPr lang="de-DE" sz="1200">
                 <a:solidFill>
                   <a:srgbClr val="000000"/>
@@ -2612,7 +2612,7 @@
                 <a:spcPct val="100000"/>
               </a:lnSpc>
             </a:pPr>
-            <a:fld id="{C79BC37F-8DCD-4434-BD51-85EB0C47D680}" type="slidenum">
+            <a:fld id="{C7BB4E9E-490E-40A2-B303-92A90F3E7854}" type="slidenum">
               <a:rPr lang="de-DE" sz="1200">
                 <a:solidFill>
                   <a:srgbClr val="000000"/>
@@ -2734,7 +2734,7 @@
                 <a:spcPct val="100000"/>
               </a:lnSpc>
             </a:pPr>
-            <a:fld id="{9570E7DE-B35C-4D1D-B231-4FDF3A34DC65}" type="slidenum">
+            <a:fld id="{5C97BDA8-209B-45FF-959F-EDABA4A46273}" type="slidenum">
               <a:rPr lang="de-DE" sz="2400">
                 <a:solidFill>
                   <a:srgbClr val="ffffff"/>
@@ -2808,7 +2808,7 @@
                 <a:spcPct val="100000"/>
               </a:lnSpc>
             </a:pPr>
-            <a:fld id="{9C71E109-3AE2-4E1C-A4E3-DBBB3C9D1705}" type="slidenum">
+            <a:fld id="{7429BDDB-0E43-4023-855F-F5D0580E4A76}" type="slidenum">
               <a:rPr lang="de-DE" sz="1200">
                 <a:solidFill>
                   <a:srgbClr val="000000"/>
@@ -2930,7 +2930,7 @@
                 <a:spcPct val="100000"/>
               </a:lnSpc>
             </a:pPr>
-            <a:fld id="{9FB423B4-758B-4AB6-B9FE-8326A34965D1}" type="slidenum">
+            <a:fld id="{D600A34E-BF01-4F70-9878-E5C381520A1D}" type="slidenum">
               <a:rPr lang="de-DE" sz="2400">
                 <a:solidFill>
                   <a:srgbClr val="ffffff"/>
@@ -3004,7 +3004,7 @@
                 <a:spcPct val="100000"/>
               </a:lnSpc>
             </a:pPr>
-            <a:fld id="{F21450DE-E901-44A6-A323-40470DBC10F2}" type="slidenum">
+            <a:fld id="{EAC54D8C-234B-4513-930A-DDF2E22EF751}" type="slidenum">
               <a:rPr lang="de-DE" sz="1200">
                 <a:solidFill>
                   <a:srgbClr val="000000"/>
@@ -3126,7 +3126,7 @@
                 <a:spcPct val="100000"/>
               </a:lnSpc>
             </a:pPr>
-            <a:fld id="{30443D87-B7D8-479C-8255-ABB35104D9FD}" type="slidenum">
+            <a:fld id="{DC4E5352-ECA6-4B79-9A92-9124442A0FB4}" type="slidenum">
               <a:rPr lang="de-DE" sz="2400">
                 <a:solidFill>
                   <a:srgbClr val="ffffff"/>
@@ -3200,7 +3200,7 @@
                 <a:spcPct val="100000"/>
               </a:lnSpc>
             </a:pPr>
-            <a:fld id="{D6A37386-5A4D-4FD1-A746-2E4189F4CA68}" type="slidenum">
+            <a:fld id="{31C7C39D-7A05-4BB3-A7B2-F2F2FB0400EC}" type="slidenum">
               <a:rPr lang="de-DE" sz="1200">
                 <a:solidFill>
                   <a:srgbClr val="000000"/>
@@ -3322,7 +3322,7 @@
                 <a:spcPct val="100000"/>
               </a:lnSpc>
             </a:pPr>
-            <a:fld id="{E832072B-6F86-4A6E-A8C6-F6E30C62C725}" type="slidenum">
+            <a:fld id="{18C05171-4C55-4490-91DE-25AEC5C8F01E}" type="slidenum">
               <a:rPr lang="de-DE" sz="2400">
                 <a:solidFill>
                   <a:srgbClr val="ffffff"/>
@@ -3396,7 +3396,7 @@
                 <a:spcPct val="100000"/>
               </a:lnSpc>
             </a:pPr>
-            <a:fld id="{EC092C17-F058-4913-B0FD-DD3F40628F52}" type="slidenum">
+            <a:fld id="{264BD867-4233-4658-824D-F0D8426F1C50}" type="slidenum">
               <a:rPr lang="de-DE" sz="1200">
                 <a:solidFill>
                   <a:srgbClr val="000000"/>
@@ -3518,7 +3518,7 @@
                 <a:spcPct val="100000"/>
               </a:lnSpc>
             </a:pPr>
-            <a:fld id="{F17F753A-3048-4BA1-80E2-F0013478C8E9}" type="slidenum">
+            <a:fld id="{C8FB7EC0-88F0-405E-9987-9BC20D132C4A}" type="slidenum">
               <a:rPr lang="de-DE" sz="1200">
                 <a:solidFill>
                   <a:srgbClr val="000000"/>
@@ -3640,7 +3640,7 @@
                 <a:spcPct val="100000"/>
               </a:lnSpc>
             </a:pPr>
-            <a:fld id="{3C6CF2CB-A657-49B6-9465-50B797E8266C}" type="slidenum">
+            <a:fld id="{1F84346E-A4D6-429B-BFAD-74677175066E}" type="slidenum">
               <a:rPr lang="de-DE" sz="1200">
                 <a:solidFill>
                   <a:srgbClr val="000000"/>
@@ -6398,7 +6398,7 @@
                 <a:spcPct val="100000"/>
               </a:lnSpc>
             </a:pPr>
-            <a:fld id="{5D4F949D-5411-46CB-ACF2-1D616FA1A50C}" type="slidenum">
+            <a:fld id="{7D7A0372-7A73-463D-970D-C2749CB4F092}" type="slidenum">
               <a:rPr lang="de-DE" sz="2400">
                 <a:solidFill>
                   <a:srgbClr val="ffffff"/>
@@ -6857,7 +6857,7 @@
                 <a:spcPct val="100000"/>
               </a:lnSpc>
             </a:pPr>
-            <a:fld id="{57C2AFEE-1B5A-4252-9CFD-D326097F86C6}" type="slidenum">
+            <a:fld id="{1B0D45CE-178E-488D-A070-A8B7FFE54A01}" type="slidenum">
               <a:rPr lang="de-DE" sz="900">
                 <a:solidFill>
                   <a:srgbClr val="ffffff"/>
@@ -7241,7 +7241,7 @@
                 <a:spcPct val="100000"/>
               </a:lnSpc>
             </a:pPr>
-            <a:fld id="{0299150E-7D55-43B8-B2C7-2B10E3C2F041}" type="slidenum">
+            <a:fld id="{A3EA8B97-A640-4709-8599-6D6F192AA47A}" type="slidenum">
               <a:rPr lang="de-DE" sz="900">
                 <a:solidFill>
                   <a:srgbClr val="ffffff"/>
@@ -7419,7 +7419,7 @@
                 <a:spcPct val="100000"/>
               </a:lnSpc>
             </a:pPr>
-            <a:fld id="{169EBC6A-1188-4CFA-8AA0-798B887D0964}" type="slidenum">
+            <a:fld id="{5FF002B9-D1C6-4204-8B46-E3A7164966C5}" type="slidenum">
               <a:rPr lang="de-DE" sz="900">
                 <a:solidFill>
                   <a:srgbClr val="ffffff"/>
@@ -7579,7 +7579,7 @@
                 <a:spcPct val="100000"/>
               </a:lnSpc>
             </a:pPr>
-            <a:fld id="{962C8E31-D6DA-40E3-A563-0A358C98E680}" type="slidenum">
+            <a:fld id="{5D5B7E09-A682-44A7-BC9F-62B7D8F7B87F}" type="slidenum">
               <a:rPr lang="de-DE" sz="900">
                 <a:solidFill>
                   <a:srgbClr val="ffffff"/>
@@ -7781,7 +7781,7 @@
                 <a:spcPct val="100000"/>
               </a:lnSpc>
             </a:pPr>
-            <a:fld id="{5DD6E8EB-7ED0-43D4-8650-5DEDA0182F98}" type="slidenum">
+            <a:fld id="{DDDB80F9-4FB0-4358-AA14-754445889DC5}" type="slidenum">
               <a:rPr lang="de-DE" sz="900">
                 <a:solidFill>
                   <a:srgbClr val="ffffff"/>
@@ -7977,7 +7977,7 @@
                 <a:spcPct val="100000"/>
               </a:lnSpc>
             </a:pPr>
-            <a:fld id="{357E00AF-3155-435F-9AEF-D7521596DE44}" type="slidenum">
+            <a:fld id="{941CE1FB-0B0E-4F1C-98A4-B9B5761940E9}" type="slidenum">
               <a:rPr lang="de-DE" sz="900">
                 <a:solidFill>
                   <a:srgbClr val="ffffff"/>
@@ -8259,7 +8259,7 @@
                 <a:spcPct val="100000"/>
               </a:lnSpc>
             </a:pPr>
-            <a:fld id="{660CC53A-40E3-482E-AC0A-6D51AA3E39B4}" type="slidenum">
+            <a:fld id="{E890062D-FAEE-47C9-80C9-C064A43482A0}" type="slidenum">
               <a:rPr lang="de-DE" sz="900">
                 <a:solidFill>
                   <a:srgbClr val="ffffff"/>
@@ -8503,7 +8503,7 @@
                 <a:spcPct val="100000"/>
               </a:lnSpc>
             </a:pPr>
-            <a:fld id="{BFE9D2DD-F603-4959-BD2B-FD9E7E0143B2}" type="slidenum">
+            <a:fld id="{C32CFA0A-17A6-4C85-8FF5-0368A2709907}" type="slidenum">
               <a:rPr lang="de-DE" sz="900">
                 <a:solidFill>
                   <a:srgbClr val="ffffff"/>
@@ -8793,7 +8793,7 @@
                 <a:spcPct val="100000"/>
               </a:lnSpc>
             </a:pPr>
-            <a:fld id="{796DDF2F-A84A-408C-8E0B-37FFB38792A9}" type="slidenum">
+            <a:fld id="{906A46BB-CB4A-4F5E-A684-01125D63AAD3}" type="slidenum">
               <a:rPr lang="de-DE" sz="900">
                 <a:solidFill>
                   <a:srgbClr val="ffffff"/>
@@ -8971,7 +8971,7 @@
                 <a:spcPct val="100000"/>
               </a:lnSpc>
             </a:pPr>
-            <a:fld id="{ADDDBBCD-D1BE-448E-8EAB-C0DDEE186CA6}" type="slidenum">
+            <a:fld id="{29F72C72-87C3-4168-8BE1-8CDCFB890878}" type="slidenum">
               <a:rPr lang="de-DE" sz="900">
                 <a:solidFill>
                   <a:srgbClr val="ffffff"/>
@@ -9311,7 +9311,7 @@
                 <a:spcPct val="100000"/>
               </a:lnSpc>
             </a:pPr>
-            <a:fld id="{A3F3E8A8-D9AA-4DBB-B631-8AD4B653E6D6}" type="slidenum">
+            <a:fld id="{A43701C4-359B-44D3-BB75-88F3AEA5055E}" type="slidenum">
               <a:rPr lang="de-DE" sz="900">
                 <a:solidFill>
                   <a:srgbClr val="ffffff"/>
@@ -9545,7 +9545,7 @@
                 <a:spcPct val="100000"/>
               </a:lnSpc>
             </a:pPr>
-            <a:fld id="{4552902A-E944-43B9-BAF6-EA777E82BB61}" type="slidenum">
+            <a:fld id="{8BD17189-064C-43DA-83F2-A7663ACF6B7B}" type="slidenum">
               <a:rPr lang="de-DE" sz="900">
                 <a:solidFill>
                   <a:srgbClr val="ffffff"/>
@@ -9737,7 +9737,7 @@
                 <a:spcPct val="100000"/>
               </a:lnSpc>
             </a:pPr>
-            <a:fld id="{5A0B7892-FE8F-40DF-BD61-1A10F4AE5F29}" type="slidenum">
+            <a:fld id="{195D4396-E3E6-4365-A022-B84F7DE79BFA}" type="slidenum">
               <a:rPr lang="de-DE" sz="900">
                 <a:solidFill>
                   <a:srgbClr val="ffffff"/>
@@ -10088,7 +10088,7 @@
                 <a:spcPct val="100000"/>
               </a:lnSpc>
             </a:pPr>
-            <a:fld id="{F8989ECF-4E3F-4644-9C9D-1CA4E1ADC37C}" type="slidenum">
+            <a:fld id="{FF945419-2987-4290-9DB2-21D78C6EA294}" type="slidenum">
               <a:rPr lang="de-DE" sz="900">
                 <a:solidFill>
                   <a:srgbClr val="ffffff"/>
@@ -10353,7 +10353,7 @@
                 <a:spcPct val="100000"/>
               </a:lnSpc>
             </a:pPr>
-            <a:fld id="{EB942150-9109-475B-84D2-886A941E4FF7}" type="slidenum">
+            <a:fld id="{E5303FFD-DC7F-411F-B5A9-3A9943271166}" type="slidenum">
               <a:rPr lang="de-DE" sz="900">
                 <a:solidFill>
                   <a:srgbClr val="ffffff"/>
@@ -10583,7 +10583,7 @@
                 <a:spcPct val="100000"/>
               </a:lnSpc>
             </a:pPr>
-            <a:fld id="{18A9AF2A-C7E8-450F-96D8-CBFFC78D5C9E}" type="slidenum">
+            <a:fld id="{CB5E3228-4F6E-4AB8-8D9A-38BA8BAFBE06}" type="slidenum">
               <a:rPr lang="de-DE" sz="900">
                 <a:solidFill>
                   <a:srgbClr val="ffffff"/>
@@ -10880,7 +10880,7 @@
                 <a:spcPct val="100000"/>
               </a:lnSpc>
             </a:pPr>
-            <a:fld id="{811DA754-E053-43B6-AE57-39F19C5EF0EF}" type="slidenum">
+            <a:fld id="{41887233-0A38-4D78-8ACF-67696D528B9F}" type="slidenum">
               <a:rPr lang="de-DE" sz="900">
                 <a:solidFill>
                   <a:srgbClr val="ffffff"/>
@@ -11135,7 +11135,7 @@
                 <a:spcPct val="100000"/>
               </a:lnSpc>
             </a:pPr>
-            <a:fld id="{521194B3-9C81-4607-A163-383B65759356}" type="slidenum">
+            <a:fld id="{773821BC-0667-4695-B8F5-E03A242335F7}" type="slidenum">
               <a:rPr lang="de-DE" sz="900">
                 <a:solidFill>
                   <a:srgbClr val="ffffff"/>
@@ -11351,7 +11351,7 @@
 </file>
 
 <file path=ppt/slides/slide7.xml><?xml version="1.0" encoding="utf-8"?>
-<p:sld xmlns:a="http://schemas.openxmlformats.org/drawingml/2006/main" xmlns:p="http://schemas.openxmlformats.org/presentationml/2006/main" xmlns:r="http://schemas.openxmlformats.org/officeDocument/2006/relationships">
+<p:sld xmlns:a="http://schemas.openxmlformats.org/drawingml/2006/main" xmlns:p="http://schemas.openxmlformats.org/presentationml/2006/main" xmlns:r="http://schemas.openxmlformats.org/officeDocument/2006/relationships" show="0">
   <p:cSld>
     <p:spTree>
       <p:nvGrpSpPr>
@@ -11390,7 +11390,7 @@
                 <a:spcPct val="100000"/>
               </a:lnSpc>
             </a:pPr>
-            <a:fld id="{EC9A1E90-41F9-4013-AB91-C0137286F15E}" type="slidenum">
+            <a:fld id="{C3C48B88-1F9E-4F22-AAE9-7FFA52E6B1BF}" type="slidenum">
               <a:rPr lang="de-DE" sz="900">
                 <a:solidFill>
                   <a:srgbClr val="ffffff"/>
@@ -11631,7 +11631,7 @@
                 <a:spcPct val="100000"/>
               </a:lnSpc>
             </a:pPr>
-            <a:fld id="{E9A7B9E0-663B-4A71-B96E-CE8B55DC89BE}" type="slidenum">
+            <a:fld id="{3D1558CF-1486-456E-8B26-7C5E175199B0}" type="slidenum">
               <a:rPr lang="de-DE" sz="900">
                 <a:solidFill>
                   <a:srgbClr val="ffffff"/>
@@ -11956,7 +11956,7 @@
                 <a:spcPct val="100000"/>
               </a:lnSpc>
             </a:pPr>
-            <a:fld id="{C93D6F1B-890E-47FC-9B6E-F2E989774205}" type="slidenum">
+            <a:fld id="{C6154570-44AD-4839-B24A-7B45AC1525C7}" type="slidenum">
               <a:rPr lang="de-DE" sz="900">
                 <a:solidFill>
                   <a:srgbClr val="ffffff"/>

</xml_diff>